<commit_message>
added 20k price to total system
</commit_message>
<xml_diff>
--- a/design_considerations/SPARC-design.pptx
+++ b/design_considerations/SPARC-design.pptx
@@ -4493,6 +4493,49 @@
           <a:p>
             <a:pPr algn="ctr"/>
             <a:endParaRPr lang="en-US"/>
+          </a:p>
+        </p:txBody>
+      </p:sp>
+      <p:sp>
+        <p:nvSpPr>
+          <p:cNvPr id="4" name="TextBox 3">
+            <a:extLst>
+              <a:ext uri="{FF2B5EF4-FFF2-40B4-BE49-F238E27FC236}">
+                <a16:creationId xmlns:a16="http://schemas.microsoft.com/office/drawing/2014/main" id="{C1C62FEF-190E-6F6F-586B-5CA1A5BE2C10}"/>
+              </a:ext>
+            </a:extLst>
+          </p:cNvPr>
+          <p:cNvSpPr txBox="1"/>
+          <p:nvPr/>
+        </p:nvSpPr>
+        <p:spPr>
+          <a:xfrm>
+            <a:off x="573281" y="5793211"/>
+            <a:ext cx="2520297" cy="646331"/>
+          </a:xfrm>
+          <a:prstGeom prst="rect">
+            <a:avLst/>
+          </a:prstGeom>
+          <a:noFill/>
+        </p:spPr>
+        <p:txBody>
+          <a:bodyPr wrap="square" rtlCol="0">
+            <a:spAutoFit/>
+          </a:bodyPr>
+          <a:lstStyle/>
+          <a:p>
+            <a:r>
+              <a:rPr lang="en-US" dirty="0"/>
+              <a:t>$20,000 for complete fully-</a:t>
+            </a:r>
+            <a:r>
+              <a:rPr lang="en-US" dirty="0" err="1"/>
+              <a:t>sensored</a:t>
+            </a:r>
+            <a:r>
+              <a:rPr lang="en-US" dirty="0"/>
+              <a:t> system</a:t>
+            </a:r>
           </a:p>
         </p:txBody>
       </p:sp>

</xml_diff>

<commit_message>
updated exploded view image
</commit_message>
<xml_diff>
--- a/design_considerations/SPARC-design.pptx
+++ b/design_considerations/SPARC-design.pptx
@@ -229,7 +229,7 @@
           <a:p>
             <a:fld id="{7D038C9C-4B69-864E-9EEE-DFA43CC144D2}" type="datetimeFigureOut">
               <a:rPr lang="en-US" smtClean="0"/>
-              <a:t>3/7/2025</a:t>
+              <a:t>3/13/2025</a:t>
             </a:fld>
             <a:endParaRPr lang="en-US"/>
           </a:p>
@@ -406,7 +406,7 @@
           <a:p>
             <a:fld id="{41D9A61E-B1D6-C34D-A321-B3E90F6DE630}" type="datetimeFigureOut">
               <a:rPr lang="en-US" smtClean="0"/>
-              <a:t>3/7/2025</a:t>
+              <a:t>3/13/2025</a:t>
             </a:fld>
             <a:endParaRPr lang="en-US"/>
           </a:p>
@@ -3470,6 +3470,36 @@
           <a:chExt cx="0" cy="0"/>
         </a:xfrm>
       </p:grpSpPr>
+      <p:pic>
+        <p:nvPicPr>
+          <p:cNvPr id="11" name="Picture 10" descr="A computer generated diagram of a machine&#10;&#10;AI-generated content may be incorrect.">
+            <a:extLst>
+              <a:ext uri="{FF2B5EF4-FFF2-40B4-BE49-F238E27FC236}">
+                <a16:creationId xmlns:a16="http://schemas.microsoft.com/office/drawing/2014/main" id="{A8973D58-BDC2-B624-0860-8EC3EBBDAC2E}"/>
+              </a:ext>
+            </a:extLst>
+          </p:cNvPr>
+          <p:cNvPicPr>
+            <a:picLocks noChangeAspect="1"/>
+          </p:cNvPicPr>
+          <p:nvPr/>
+        </p:nvPicPr>
+        <p:blipFill>
+          <a:blip r:embed="rId3"/>
+          <a:stretch>
+            <a:fillRect/>
+          </a:stretch>
+        </p:blipFill>
+        <p:spPr>
+          <a:xfrm>
+            <a:off x="981296" y="1166419"/>
+            <a:ext cx="9500364" cy="5192131"/>
+          </a:xfrm>
+          <a:prstGeom prst="rect">
+            <a:avLst/>
+          </a:prstGeom>
+        </p:spPr>
+      </p:pic>
       <p:sp>
         <p:nvSpPr>
           <p:cNvPr id="2" name="Title 1">
@@ -3535,51 +3565,6 @@
           </a:p>
         </p:txBody>
       </p:sp>
-      <p:pic>
-        <p:nvPicPr>
-          <p:cNvPr id="1026" name="Picture 2" descr="drawing">
-            <a:extLst>
-              <a:ext uri="{FF2B5EF4-FFF2-40B4-BE49-F238E27FC236}">
-                <a16:creationId xmlns:a16="http://schemas.microsoft.com/office/drawing/2014/main" id="{1DEEF5B3-7B99-2802-2484-4AD5346C0F26}"/>
-              </a:ext>
-            </a:extLst>
-          </p:cNvPr>
-          <p:cNvPicPr>
-            <a:picLocks noChangeAspect="1" noChangeArrowheads="1"/>
-          </p:cNvPicPr>
-          <p:nvPr/>
-        </p:nvPicPr>
-        <p:blipFill rotWithShape="1">
-          <a:blip r:embed="rId3">
-            <a:extLst>
-              <a:ext uri="{28A0092B-C50C-407E-A947-70E740481C1C}">
-                <a14:useLocalDpi xmlns:a14="http://schemas.microsoft.com/office/drawing/2010/main" val="0"/>
-              </a:ext>
-            </a:extLst>
-          </a:blip>
-          <a:srcRect t="26700" b="21792"/>
-          <a:stretch/>
-        </p:blipFill>
-        <p:spPr bwMode="auto">
-          <a:xfrm>
-            <a:off x="940725" y="1427233"/>
-            <a:ext cx="9446903" cy="4942216"/>
-          </a:xfrm>
-          <a:prstGeom prst="rect">
-            <a:avLst/>
-          </a:prstGeom>
-          <a:noFill/>
-          <a:extLst>
-            <a:ext uri="{909E8E84-426E-40DD-AFC4-6F175D3DCCD1}">
-              <a14:hiddenFill xmlns:a14="http://schemas.microsoft.com/office/drawing/2010/main">
-                <a:solidFill>
-                  <a:srgbClr val="FFFFFF"/>
-                </a:solidFill>
-              </a14:hiddenFill>
-            </a:ext>
-          </a:extLst>
-        </p:spPr>
-      </p:pic>
       <p:sp>
         <p:nvSpPr>
           <p:cNvPr id="7" name="TextBox 6">
@@ -3594,7 +3579,7 @@
         </p:nvSpPr>
         <p:spPr>
           <a:xfrm>
-            <a:off x="8634202" y="1974457"/>
+            <a:off x="8279378" y="2367498"/>
             <a:ext cx="1753426" cy="369332"/>
           </a:xfrm>
           <a:prstGeom prst="rect">
@@ -3629,7 +3614,7 @@
         </p:nvSpPr>
         <p:spPr>
           <a:xfrm>
-            <a:off x="1507032" y="3598307"/>
+            <a:off x="2155866" y="4880651"/>
             <a:ext cx="1753426" cy="369332"/>
           </a:xfrm>
           <a:prstGeom prst="rect">
@@ -3664,7 +3649,7 @@
         </p:nvSpPr>
         <p:spPr>
           <a:xfrm>
-            <a:off x="7646325" y="5320784"/>
+            <a:off x="7335175" y="5749981"/>
             <a:ext cx="1753426" cy="369332"/>
           </a:xfrm>
           <a:prstGeom prst="rect">
@@ -3699,7 +3684,7 @@
         </p:nvSpPr>
         <p:spPr>
           <a:xfrm>
-            <a:off x="3189211" y="5625212"/>
+            <a:off x="2868698" y="2445028"/>
             <a:ext cx="1753426" cy="369332"/>
           </a:xfrm>
           <a:prstGeom prst="rect">
@@ -3715,7 +3700,7 @@
           <a:p>
             <a:r>
               <a:rPr lang="en-US" dirty="0"/>
-              <a:t>Thermal pads</a:t>
+              <a:t>Thermal pad</a:t>
             </a:r>
           </a:p>
         </p:txBody>
@@ -3735,9 +3720,9 @@
           <p:nvPr/>
         </p:nvCxnSpPr>
         <p:spPr>
-          <a:xfrm flipV="1">
-            <a:off x="4801729" y="5430767"/>
-            <a:ext cx="929749" cy="369332"/>
+          <a:xfrm>
+            <a:off x="4336854" y="2657695"/>
+            <a:ext cx="978096" cy="301405"/>
           </a:xfrm>
           <a:prstGeom prst="straightConnector1">
             <a:avLst/>
@@ -3777,8 +3762,8 @@
         </p:nvCxnSpPr>
         <p:spPr>
           <a:xfrm flipV="1">
-            <a:off x="2724336" y="3293507"/>
-            <a:ext cx="929749" cy="369332"/>
+            <a:off x="3473532" y="3938032"/>
+            <a:ext cx="946068" cy="324855"/>
           </a:xfrm>
           <a:prstGeom prst="straightConnector1">
             <a:avLst/>
@@ -3817,9 +3802,9 @@
           <p:nvPr/>
         </p:nvCxnSpPr>
         <p:spPr>
-          <a:xfrm>
-            <a:off x="2724336" y="3873500"/>
-            <a:ext cx="929749" cy="622300"/>
+          <a:xfrm flipV="1">
+            <a:off x="3314700" y="4927068"/>
+            <a:ext cx="737688" cy="138249"/>
           </a:xfrm>
           <a:prstGeom prst="straightConnector1">
             <a:avLst/>
@@ -3859,7 +3844,7 @@
         </p:nvCxnSpPr>
         <p:spPr>
           <a:xfrm flipH="1" flipV="1">
-            <a:off x="6864350" y="2141188"/>
+            <a:off x="6509526" y="2534229"/>
             <a:ext cx="1720850" cy="22907"/>
           </a:xfrm>
           <a:prstGeom prst="straightConnector1">
@@ -3900,7 +3885,7 @@
         </p:nvCxnSpPr>
         <p:spPr>
           <a:xfrm flipH="1" flipV="1">
-            <a:off x="6680153" y="4819650"/>
+            <a:off x="6369003" y="5248847"/>
             <a:ext cx="920797" cy="611117"/>
           </a:xfrm>
           <a:prstGeom prst="straightConnector1">
@@ -3939,7 +3924,7 @@
         </p:nvSpPr>
         <p:spPr>
           <a:xfrm>
-            <a:off x="7272471" y="3782973"/>
+            <a:off x="7128807" y="4078221"/>
             <a:ext cx="1753426" cy="369332"/>
           </a:xfrm>
           <a:prstGeom prst="rect">
@@ -3976,7 +3961,7 @@
         </p:nvCxnSpPr>
         <p:spPr>
           <a:xfrm flipH="1">
-            <a:off x="6375163" y="3967639"/>
+            <a:off x="6231499" y="4262887"/>
             <a:ext cx="897308" cy="0"/>
           </a:xfrm>
           <a:prstGeom prst="straightConnector1">
@@ -4001,6 +3986,41 @@
           </a:fontRef>
         </p:style>
       </p:cxnSp>
+      <p:sp>
+        <p:nvSpPr>
+          <p:cNvPr id="23" name="TextBox 22">
+            <a:extLst>
+              <a:ext uri="{FF2B5EF4-FFF2-40B4-BE49-F238E27FC236}">
+                <a16:creationId xmlns:a16="http://schemas.microsoft.com/office/drawing/2014/main" id="{3896F676-6698-92F1-506C-CA51A3B1C05F}"/>
+              </a:ext>
+            </a:extLst>
+          </p:cNvPr>
+          <p:cNvSpPr txBox="1"/>
+          <p:nvPr/>
+        </p:nvSpPr>
+        <p:spPr>
+          <a:xfrm>
+            <a:off x="1442054" y="4052370"/>
+            <a:ext cx="2164343" cy="369332"/>
+          </a:xfrm>
+          <a:prstGeom prst="rect">
+            <a:avLst/>
+          </a:prstGeom>
+          <a:noFill/>
+        </p:spPr>
+        <p:txBody>
+          <a:bodyPr wrap="square" rtlCol="0">
+            <a:spAutoFit/>
+          </a:bodyPr>
+          <a:lstStyle/>
+          <a:p>
+            <a:r>
+              <a:rPr lang="en-US" dirty="0"/>
+              <a:t>Assembly springs</a:t>
+            </a:r>
+          </a:p>
+        </p:txBody>
+      </p:sp>
     </p:spTree>
     <p:extLst>
       <p:ext uri="{BB962C8B-B14F-4D97-AF65-F5344CB8AC3E}">

</xml_diff>